<commit_message>
revise slide template 1 and add slide template 2
</commit_message>
<xml_diff>
--- a/Templates/华科开放原子开源俱乐部模板.pptx
+++ b/Templates/华科开放原子开源俱乐部模板.pptx
@@ -5,14 +5,12 @@
     <p:sldMasterId id="2147483648" r:id="rId1"/>
   </p:sldMasterIdLst>
   <p:notesMasterIdLst>
-    <p:notesMasterId r:id="rId7"/>
+    <p:notesMasterId r:id="rId5"/>
   </p:notesMasterIdLst>
   <p:sldIdLst>
     <p:sldId id="256" r:id="rId2"/>
     <p:sldId id="261" r:id="rId3"/>
-    <p:sldId id="258" r:id="rId4"/>
-    <p:sldId id="259" r:id="rId5"/>
-    <p:sldId id="260" r:id="rId6"/>
+    <p:sldId id="260" r:id="rId4"/>
   </p:sldIdLst>
   <p:sldSz cx="12192000" cy="6858000"/>
   <p:notesSz cx="6858000" cy="9144000"/>
@@ -201,7 +199,7 @@
           <a:p>
             <a:fld id="{3CA5CA05-0A2D-A742-9267-F735107A5C89}" type="datetimeFigureOut">
               <a:rPr kumimoji="1" lang="zh-CN" altLang="en-US" smtClean="0"/>
-              <a:t>2024/11/20</a:t>
+              <a:t>2026/2/3</a:t>
             </a:fld>
             <a:endParaRPr kumimoji="1" lang="zh-CN" altLang="en-US"/>
           </a:p>
@@ -510,7 +508,21 @@
         <p:txBody>
           <a:bodyPr anchor="b"/>
           <a:lstStyle>
-            <a:lvl1pPr algn="ctr">
+            <a:lvl1pPr marL="0" marR="0" indent="0" algn="ctr" defTabSz="914400" rtl="0" eaLnBrk="1" fontAlgn="auto" latinLnBrk="0" hangingPunct="1">
+              <a:lnSpc>
+                <a:spcPct val="90000"/>
+              </a:lnSpc>
+              <a:spcBef>
+                <a:spcPct val="0"/>
+              </a:spcBef>
+              <a:spcAft>
+                <a:spcPts val="0"/>
+              </a:spcAft>
+              <a:buClrTx/>
+              <a:buSzTx/>
+              <a:buFontTx/>
+              <a:buNone/>
+              <a:tabLst/>
               <a:defRPr sz="6000">
                 <a:latin typeface="KaiTi" panose="02010609060101010101" pitchFamily="49" charset="-122"/>
                 <a:ea typeface="KaiTi" panose="02010609060101010101" pitchFamily="49" charset="-122"/>
@@ -518,6 +530,26 @@
             </a:lvl1pPr>
           </a:lstStyle>
           <a:p>
+            <a:pPr marL="0" marR="0" lvl="0" indent="0" algn="ctr" defTabSz="914400" rtl="0" eaLnBrk="1" fontAlgn="auto" latinLnBrk="0" hangingPunct="1">
+              <a:lnSpc>
+                <a:spcPct val="90000"/>
+              </a:lnSpc>
+              <a:spcBef>
+                <a:spcPct val="0"/>
+              </a:spcBef>
+              <a:spcAft>
+                <a:spcPts val="0"/>
+              </a:spcAft>
+              <a:buClrTx/>
+              <a:buSzTx/>
+              <a:buFontTx/>
+              <a:buNone/>
+              <a:tabLst/>
+              <a:defRPr/>
+            </a:pPr>
+            <a:br>
+              <a:rPr kumimoji="1" lang="zh-CN" altLang="en-US" dirty="0"/>
+            </a:br>
             <a:r>
               <a:rPr kumimoji="1" lang="zh-CN" altLang="en-US" dirty="0">
                 <a:latin typeface="KaiTi" panose="02010609060101010101" pitchFamily="49" charset="-122"/>
@@ -602,12 +634,6 @@
               <a:t>报告人姓名</a:t>
             </a:r>
             <a:endParaRPr kumimoji="1" lang="en-US" altLang="zh-CN" dirty="0"/>
-          </a:p>
-          <a:p>
-            <a:r>
-              <a:rPr kumimoji="1" lang="zh-CN" altLang="en-US" dirty="0"/>
-              <a:t>华中科技大学开放原子开源俱乐部</a:t>
-            </a:r>
           </a:p>
         </p:txBody>
       </p:sp>
@@ -719,7 +745,7 @@
         <p:spPr>
           <a:xfrm>
             <a:off x="838200" y="144000"/>
-            <a:ext cx="10515600" cy="1080000"/>
+            <a:ext cx="8869822" cy="1080000"/>
           </a:xfrm>
         </p:spPr>
         <p:txBody>
@@ -911,7 +937,7 @@
         <p:spPr>
           <a:xfrm>
             <a:off x="838800" y="144000"/>
-            <a:ext cx="10515600" cy="1080000"/>
+            <a:ext cx="8886314" cy="1080000"/>
           </a:xfrm>
         </p:spPr>
         <p:txBody>
@@ -1641,26 +1667,10 @@
           <a:bodyPr/>
           <a:lstStyle/>
           <a:p>
-            <a:r>
-              <a:rPr kumimoji="1" lang="zh-CN" altLang="en-US" dirty="0">
-                <a:latin typeface="KaiTi" panose="02010609060101010101" pitchFamily="49" charset="-122"/>
-                <a:ea typeface="KaiTi" panose="02010609060101010101" pitchFamily="49" charset="-122"/>
-              </a:rPr>
-              <a:t>华中科技大学</a:t>
-            </a:r>
-            <a:br>
-              <a:rPr kumimoji="1" lang="en-US" altLang="zh-CN" dirty="0">
-                <a:latin typeface="KaiTi" panose="02010609060101010101" pitchFamily="49" charset="-122"/>
-                <a:ea typeface="KaiTi" panose="02010609060101010101" pitchFamily="49" charset="-122"/>
-              </a:rPr>
-            </a:br>
-            <a:r>
-              <a:rPr kumimoji="1" lang="zh-CN" altLang="en-US" dirty="0">
-                <a:latin typeface="KaiTi" panose="02010609060101010101" pitchFamily="49" charset="-122"/>
-                <a:ea typeface="KaiTi" panose="02010609060101010101" pitchFamily="49" charset="-122"/>
-              </a:rPr>
-              <a:t>开放原子开源俱乐部</a:t>
-            </a:r>
+            <a:endParaRPr kumimoji="1" lang="zh-CN" altLang="en-US" dirty="0">
+              <a:latin typeface="KaiTi" panose="02010609060101010101" pitchFamily="49" charset="-122"/>
+              <a:ea typeface="KaiTi" panose="02010609060101010101" pitchFamily="49" charset="-122"/>
+            </a:endParaRPr>
           </a:p>
         </p:txBody>
       </p:sp>
@@ -1692,26 +1702,10 @@
           </a:bodyPr>
           <a:lstStyle/>
           <a:p>
-            <a:r>
-              <a:rPr kumimoji="1" lang="zh-CN" altLang="en-US" dirty="0">
-                <a:latin typeface="KaiTi" panose="02010609060101010101" pitchFamily="49" charset="-122"/>
-                <a:ea typeface="KaiTi" panose="02010609060101010101" pitchFamily="49" charset="-122"/>
-              </a:rPr>
-              <a:t>慕冬亮</a:t>
-            </a:r>
             <a:endParaRPr kumimoji="1" lang="en-US" altLang="zh-CN" dirty="0">
               <a:latin typeface="KaiTi" panose="02010609060101010101" pitchFamily="49" charset="-122"/>
               <a:ea typeface="KaiTi" panose="02010609060101010101" pitchFamily="49" charset="-122"/>
             </a:endParaRPr>
-          </a:p>
-          <a:p>
-            <a:r>
-              <a:rPr kumimoji="1" lang="zh-CN" altLang="en-US" dirty="0">
-                <a:latin typeface="KaiTi" panose="02010609060101010101" pitchFamily="49" charset="-122"/>
-                <a:ea typeface="KaiTi" panose="02010609060101010101" pitchFamily="49" charset="-122"/>
-              </a:rPr>
-              <a:t>社团指导教师</a:t>
-            </a:r>
           </a:p>
         </p:txBody>
       </p:sp>
@@ -1766,10 +1760,7 @@
           <a:bodyPr/>
           <a:lstStyle/>
           <a:p>
-            <a:r>
-              <a:rPr kumimoji="1" lang="zh-CN" altLang="en-US" dirty="0"/>
-              <a:t>第一部分</a:t>
-            </a:r>
+            <a:endParaRPr kumimoji="1" lang="zh-CN" altLang="en-US" dirty="0"/>
           </a:p>
         </p:txBody>
       </p:sp>
@@ -1794,10 +1785,6 @@
           <a:bodyPr/>
           <a:lstStyle/>
           <a:p>
-            <a:r>
-              <a:rPr kumimoji="1" lang="en-US" altLang="zh-CN" dirty="0"/>
-              <a:t>XXX</a:t>
-            </a:r>
             <a:endParaRPr kumimoji="1" lang="zh-CN" altLang="en-US" dirty="0"/>
           </a:p>
         </p:txBody>
@@ -1866,238 +1853,6 @@
           <p:cNvPr id="2" name="标题 1">
             <a:extLst>
               <a:ext uri="{FF2B5EF4-FFF2-40B4-BE49-F238E27FC236}">
-                <a16:creationId xmlns:a16="http://schemas.microsoft.com/office/drawing/2014/main" id="{9D914E03-5D72-5317-9B9A-7DB50EF6BE48}"/>
-              </a:ext>
-            </a:extLst>
-          </p:cNvPr>
-          <p:cNvSpPr>
-            <a:spLocks noGrp="1"/>
-          </p:cNvSpPr>
-          <p:nvPr>
-            <p:ph type="title"/>
-          </p:nvPr>
-        </p:nvSpPr>
-        <p:spPr/>
-        <p:txBody>
-          <a:bodyPr/>
-          <a:lstStyle/>
-          <a:p>
-            <a:r>
-              <a:rPr kumimoji="1" lang="zh-CN" altLang="en-US" dirty="0"/>
-              <a:t>第二部分</a:t>
-            </a:r>
-          </a:p>
-        </p:txBody>
-      </p:sp>
-      <p:sp>
-        <p:nvSpPr>
-          <p:cNvPr id="3" name="内容占位符 2">
-            <a:extLst>
-              <a:ext uri="{FF2B5EF4-FFF2-40B4-BE49-F238E27FC236}">
-                <a16:creationId xmlns:a16="http://schemas.microsoft.com/office/drawing/2014/main" id="{E38D2930-C32C-9042-1870-BC4C5422ED88}"/>
-              </a:ext>
-            </a:extLst>
-          </p:cNvPr>
-          <p:cNvSpPr>
-            <a:spLocks noGrp="1"/>
-          </p:cNvSpPr>
-          <p:nvPr>
-            <p:ph idx="1"/>
-          </p:nvPr>
-        </p:nvSpPr>
-        <p:spPr/>
-        <p:txBody>
-          <a:bodyPr/>
-          <a:lstStyle/>
-          <a:p>
-            <a:r>
-              <a:rPr kumimoji="1" lang="en-US" altLang="zh-CN" dirty="0"/>
-              <a:t>XXX</a:t>
-            </a:r>
-            <a:endParaRPr kumimoji="1" lang="zh-CN" altLang="en-US" dirty="0"/>
-          </a:p>
-        </p:txBody>
-      </p:sp>
-      <p:sp>
-        <p:nvSpPr>
-          <p:cNvPr id="4" name="灯片编号占位符 3">
-            <a:extLst>
-              <a:ext uri="{FF2B5EF4-FFF2-40B4-BE49-F238E27FC236}">
-                <a16:creationId xmlns:a16="http://schemas.microsoft.com/office/drawing/2014/main" id="{59ED48E3-617B-E70C-57C5-34C47537DD8F}"/>
-              </a:ext>
-            </a:extLst>
-          </p:cNvPr>
-          <p:cNvSpPr>
-            <a:spLocks noGrp="1"/>
-          </p:cNvSpPr>
-          <p:nvPr>
-            <p:ph type="sldNum" sz="quarter" idx="12"/>
-          </p:nvPr>
-        </p:nvSpPr>
-        <p:spPr/>
-        <p:txBody>
-          <a:bodyPr/>
-          <a:lstStyle/>
-          <a:p>
-            <a:fld id="{CFA3B129-E853-7E44-B4A9-F8C030231302}" type="slidenum">
-              <a:rPr kumimoji="1" lang="zh-CN" altLang="en-US" smtClean="0"/>
-              <a:t>3</a:t>
-            </a:fld>
-            <a:endParaRPr kumimoji="1" lang="zh-CN" altLang="en-US"/>
-          </a:p>
-        </p:txBody>
-      </p:sp>
-    </p:spTree>
-    <p:extLst>
-      <p:ext uri="{BB962C8B-B14F-4D97-AF65-F5344CB8AC3E}">
-        <p14:creationId xmlns:p14="http://schemas.microsoft.com/office/powerpoint/2010/main" val="2251252701"/>
-      </p:ext>
-    </p:extLst>
-  </p:cSld>
-  <p:clrMapOvr>
-    <a:masterClrMapping/>
-  </p:clrMapOvr>
-</p:sld>
-</file>
-
-<file path=ppt/slides/slide4.xml><?xml version="1.0" encoding="utf-8"?>
-<p:sld xmlns:a="http://schemas.openxmlformats.org/drawingml/2006/main" xmlns:r="http://schemas.openxmlformats.org/officeDocument/2006/relationships" xmlns:p="http://schemas.openxmlformats.org/presentationml/2006/main">
-  <p:cSld>
-    <p:spTree>
-      <p:nvGrpSpPr>
-        <p:cNvPr id="1" name=""/>
-        <p:cNvGrpSpPr/>
-        <p:nvPr/>
-      </p:nvGrpSpPr>
-      <p:grpSpPr>
-        <a:xfrm>
-          <a:off x="0" y="0"/>
-          <a:ext cx="0" cy="0"/>
-          <a:chOff x="0" y="0"/>
-          <a:chExt cx="0" cy="0"/>
-        </a:xfrm>
-      </p:grpSpPr>
-      <p:sp>
-        <p:nvSpPr>
-          <p:cNvPr id="2" name="标题 1">
-            <a:extLst>
-              <a:ext uri="{FF2B5EF4-FFF2-40B4-BE49-F238E27FC236}">
-                <a16:creationId xmlns:a16="http://schemas.microsoft.com/office/drawing/2014/main" id="{9D914E03-5D72-5317-9B9A-7DB50EF6BE48}"/>
-              </a:ext>
-            </a:extLst>
-          </p:cNvPr>
-          <p:cNvSpPr>
-            <a:spLocks noGrp="1"/>
-          </p:cNvSpPr>
-          <p:nvPr>
-            <p:ph type="title"/>
-          </p:nvPr>
-        </p:nvSpPr>
-        <p:spPr/>
-        <p:txBody>
-          <a:bodyPr/>
-          <a:lstStyle/>
-          <a:p>
-            <a:r>
-              <a:rPr kumimoji="1" lang="zh-CN" altLang="en-US" dirty="0"/>
-              <a:t>第三部分</a:t>
-            </a:r>
-          </a:p>
-        </p:txBody>
-      </p:sp>
-      <p:sp>
-        <p:nvSpPr>
-          <p:cNvPr id="3" name="内容占位符 2">
-            <a:extLst>
-              <a:ext uri="{FF2B5EF4-FFF2-40B4-BE49-F238E27FC236}">
-                <a16:creationId xmlns:a16="http://schemas.microsoft.com/office/drawing/2014/main" id="{E38D2930-C32C-9042-1870-BC4C5422ED88}"/>
-              </a:ext>
-            </a:extLst>
-          </p:cNvPr>
-          <p:cNvSpPr>
-            <a:spLocks noGrp="1"/>
-          </p:cNvSpPr>
-          <p:nvPr>
-            <p:ph idx="1"/>
-          </p:nvPr>
-        </p:nvSpPr>
-        <p:spPr/>
-        <p:txBody>
-          <a:bodyPr/>
-          <a:lstStyle/>
-          <a:p>
-            <a:r>
-              <a:rPr kumimoji="1" lang="en-US" altLang="zh-CN" dirty="0"/>
-              <a:t>XXX</a:t>
-            </a:r>
-            <a:endParaRPr kumimoji="1" lang="zh-CN" altLang="en-US" dirty="0"/>
-          </a:p>
-        </p:txBody>
-      </p:sp>
-      <p:sp>
-        <p:nvSpPr>
-          <p:cNvPr id="4" name="灯片编号占位符 3">
-            <a:extLst>
-              <a:ext uri="{FF2B5EF4-FFF2-40B4-BE49-F238E27FC236}">
-                <a16:creationId xmlns:a16="http://schemas.microsoft.com/office/drawing/2014/main" id="{7152C4F5-3463-D943-365D-4EF9001F408B}"/>
-              </a:ext>
-            </a:extLst>
-          </p:cNvPr>
-          <p:cNvSpPr>
-            <a:spLocks noGrp="1"/>
-          </p:cNvSpPr>
-          <p:nvPr>
-            <p:ph type="sldNum" sz="quarter" idx="12"/>
-          </p:nvPr>
-        </p:nvSpPr>
-        <p:spPr/>
-        <p:txBody>
-          <a:bodyPr/>
-          <a:lstStyle/>
-          <a:p>
-            <a:fld id="{CFA3B129-E853-7E44-B4A9-F8C030231302}" type="slidenum">
-              <a:rPr kumimoji="1" lang="zh-CN" altLang="en-US" smtClean="0"/>
-              <a:t>4</a:t>
-            </a:fld>
-            <a:endParaRPr kumimoji="1" lang="zh-CN" altLang="en-US"/>
-          </a:p>
-        </p:txBody>
-      </p:sp>
-    </p:spTree>
-    <p:extLst>
-      <p:ext uri="{BB962C8B-B14F-4D97-AF65-F5344CB8AC3E}">
-        <p14:creationId xmlns:p14="http://schemas.microsoft.com/office/powerpoint/2010/main" val="3098652099"/>
-      </p:ext>
-    </p:extLst>
-  </p:cSld>
-  <p:clrMapOvr>
-    <a:masterClrMapping/>
-  </p:clrMapOvr>
-</p:sld>
-</file>
-
-<file path=ppt/slides/slide5.xml><?xml version="1.0" encoding="utf-8"?>
-<p:sld xmlns:a="http://schemas.openxmlformats.org/drawingml/2006/main" xmlns:r="http://schemas.openxmlformats.org/officeDocument/2006/relationships" xmlns:p="http://schemas.openxmlformats.org/presentationml/2006/main">
-  <p:cSld>
-    <p:spTree>
-      <p:nvGrpSpPr>
-        <p:cNvPr id="1" name=""/>
-        <p:cNvGrpSpPr/>
-        <p:nvPr/>
-      </p:nvGrpSpPr>
-      <p:grpSpPr>
-        <a:xfrm>
-          <a:off x="0" y="0"/>
-          <a:ext cx="0" cy="0"/>
-          <a:chOff x="0" y="0"/>
-          <a:chExt cx="0" cy="0"/>
-        </a:xfrm>
-      </p:grpSpPr>
-      <p:sp>
-        <p:nvSpPr>
-          <p:cNvPr id="2" name="标题 1">
-            <a:extLst>
-              <a:ext uri="{FF2B5EF4-FFF2-40B4-BE49-F238E27FC236}">
                 <a16:creationId xmlns:a16="http://schemas.microsoft.com/office/drawing/2014/main" id="{64CD042E-83F4-93FE-D00C-0E9CAB53E0C7}"/>
               </a:ext>
             </a:extLst>
@@ -2236,7 +1991,7 @@
           <a:p>
             <a:fld id="{CFA3B129-E853-7E44-B4A9-F8C030231302}" type="slidenum">
               <a:rPr kumimoji="1" lang="zh-CN" altLang="en-US" smtClean="0"/>
-              <a:t>5</a:t>
+              <a:t>3</a:t>
             </a:fld>
             <a:endParaRPr kumimoji="1" lang="zh-CN" altLang="en-US"/>
           </a:p>

</xml_diff>